<commit_message>
Polish the whole paper
</commit_message>
<xml_diff>
--- a/figure/make_figures.pptx
+++ b/figure/make_figures.pptx
@@ -8250,7 +8250,7 @@
               <a:graphicData uri="http://schemas.openxmlformats.org/presentationml/2006/ole">
                 <mc:AlternateContent xmlns:mc="http://schemas.openxmlformats.org/markup-compatibility/2006">
                   <mc:Choice xmlns:v="urn:schemas-microsoft-com:vml" Requires="v">
-                    <p:oleObj spid="_x0000_s3230" name="Equation" r:id="rId3" imgW="901700" imgH="330200" progId="Equation.DSMT4">
+                    <p:oleObj spid="_x0000_s3234" name="Equation" r:id="rId3" imgW="901700" imgH="330200" progId="Equation.DSMT4">
                       <p:embed/>
                     </p:oleObj>
                   </mc:Choice>
@@ -9091,7 +9091,7 @@
               <a:graphicData uri="http://schemas.openxmlformats.org/presentationml/2006/ole">
                 <mc:AlternateContent xmlns:mc="http://schemas.openxmlformats.org/markup-compatibility/2006">
                   <mc:Choice xmlns:v="urn:schemas-microsoft-com:vml" Requires="v">
-                    <p:oleObj spid="_x0000_s3231" name="Equation" r:id="rId6" imgW="927100" imgH="330200" progId="Equation.DSMT4">
+                    <p:oleObj spid="_x0000_s3235" name="Equation" r:id="rId6" imgW="927100" imgH="330200" progId="Equation.DSMT4">
                       <p:embed/>
                     </p:oleObj>
                   </mc:Choice>
@@ -9488,7 +9488,7 @@
             <a:graphicData uri="http://schemas.openxmlformats.org/presentationml/2006/ole">
               <mc:AlternateContent xmlns:mc="http://schemas.openxmlformats.org/markup-compatibility/2006">
                 <mc:Choice xmlns:v="urn:schemas-microsoft-com:vml" Requires="v">
-                  <p:oleObj spid="_x0000_s3232" name="Equation" r:id="rId8" imgW="1181100" imgH="393700" progId="Equation.DSMT4">
+                  <p:oleObj spid="_x0000_s3236" name="Equation" r:id="rId8" imgW="1181100" imgH="393700" progId="Equation.DSMT4">
                     <p:embed/>
                   </p:oleObj>
                 </mc:Choice>
@@ -9793,7 +9793,7 @@
             <a:graphicData uri="http://schemas.openxmlformats.org/presentationml/2006/ole">
               <mc:AlternateContent xmlns:mc="http://schemas.openxmlformats.org/markup-compatibility/2006">
                 <mc:Choice xmlns:v="urn:schemas-microsoft-com:vml" Requires="v">
-                  <p:oleObj spid="_x0000_s3233" name="Equation" r:id="rId10" imgW="1168400" imgH="393700" progId="Equation.DSMT4">
+                  <p:oleObj spid="_x0000_s3237" name="Equation" r:id="rId10" imgW="1168400" imgH="393700" progId="Equation.DSMT4">
                     <p:embed/>
                   </p:oleObj>
                 </mc:Choice>
@@ -15809,7 +15809,7 @@
           <a:graphicData uri="http://schemas.openxmlformats.org/presentationml/2006/ole">
             <mc:AlternateContent xmlns:mc="http://schemas.openxmlformats.org/markup-compatibility/2006">
               <mc:Choice xmlns:v="urn:schemas-microsoft-com:vml" Requires="v">
-                <p:oleObj spid="_x0000_s1144" name="Equation" r:id="rId7" imgW="927100" imgH="330200" progId="Equation.DSMT4">
+                <p:oleObj spid="_x0000_s1152" name="Equation" r:id="rId7" imgW="927100" imgH="330200" progId="Equation.DSMT4">
                   <p:embed/>
                 </p:oleObj>
               </mc:Choice>
@@ -15910,7 +15910,7 @@
           <a:graphicData uri="http://schemas.openxmlformats.org/presentationml/2006/ole">
             <mc:AlternateContent xmlns:mc="http://schemas.openxmlformats.org/markup-compatibility/2006">
               <mc:Choice xmlns:v="urn:schemas-microsoft-com:vml" Requires="v">
-                <p:oleObj spid="_x0000_s1145" name="Equation" r:id="rId9" imgW="901700" imgH="330200" progId="Equation.DSMT4">
+                <p:oleObj spid="_x0000_s1153" name="Equation" r:id="rId9" imgW="901700" imgH="330200" progId="Equation.DSMT4">
                   <p:embed/>
                 </p:oleObj>
               </mc:Choice>
@@ -15967,7 +15967,7 @@
           <a:graphicData uri="http://schemas.openxmlformats.org/presentationml/2006/ole">
             <mc:AlternateContent xmlns:mc="http://schemas.openxmlformats.org/markup-compatibility/2006">
               <mc:Choice xmlns:v="urn:schemas-microsoft-com:vml" Requires="v">
-                <p:oleObj spid="_x0000_s1146" name="Equation" r:id="rId11" imgW="1181100" imgH="393700" progId="Equation.DSMT4">
+                <p:oleObj spid="_x0000_s1154" name="Equation" r:id="rId11" imgW="1181100" imgH="393700" progId="Equation.DSMT4">
                   <p:embed/>
                 </p:oleObj>
               </mc:Choice>
@@ -16024,7 +16024,7 @@
           <a:graphicData uri="http://schemas.openxmlformats.org/presentationml/2006/ole">
             <mc:AlternateContent xmlns:mc="http://schemas.openxmlformats.org/markup-compatibility/2006">
               <mc:Choice xmlns:v="urn:schemas-microsoft-com:vml" Requires="v">
-                <p:oleObj spid="_x0000_s1147" name="Equation" r:id="rId13" imgW="1168400" imgH="393700" progId="Equation.DSMT4">
+                <p:oleObj spid="_x0000_s1155" name="Equation" r:id="rId13" imgW="1168400" imgH="393700" progId="Equation.DSMT4">
                   <p:embed/>
                 </p:oleObj>
               </mc:Choice>
@@ -17708,7 +17708,7 @@
           <a:p>
             <a:pPr algn="ctr"/>
             <a:r>
-              <a:rPr kumimoji="1" lang="en-US" altLang="zh-CN" sz="3200" b="1" dirty="0" smtClean="0">
+              <a:rPr kumimoji="1" lang="en-US" altLang="zh-CN" sz="3200" dirty="0" smtClean="0">
                 <a:solidFill>
                   <a:srgbClr val="0E0E0E"/>
                 </a:solidFill>
@@ -17717,7 +17717,7 @@
               </a:rPr>
               <a:t>Image </a:t>
             </a:r>
-            <a:endParaRPr kumimoji="1" lang="zh-CN" altLang="en-US" sz="3200" b="1" dirty="0">
+            <a:endParaRPr kumimoji="1" lang="zh-CN" altLang="en-US" sz="3200" dirty="0">
               <a:solidFill>
                 <a:srgbClr val="0E0E0E"/>
               </a:solidFill>
@@ -17735,7 +17735,7 @@
         </p:nvSpPr>
         <p:spPr>
           <a:xfrm>
-            <a:off x="-3074720" y="1626069"/>
+            <a:off x="-3074720" y="1616675"/>
             <a:ext cx="1404182" cy="872126"/>
           </a:xfrm>
           <a:prstGeom prst="rect">
@@ -17768,7 +17768,7 @@
           <a:p>
             <a:pPr algn="ctr"/>
             <a:r>
-              <a:rPr kumimoji="1" lang="en-US" altLang="zh-CN" sz="2400" b="1" dirty="0" smtClean="0">
+              <a:rPr kumimoji="1" lang="en-US" altLang="zh-CN" sz="2400" dirty="0" smtClean="0">
                 <a:solidFill>
                   <a:srgbClr val="0E0E0E"/>
                 </a:solidFill>
@@ -17781,7 +17781,7 @@
           <a:p>
             <a:pPr algn="ctr"/>
             <a:r>
-              <a:rPr kumimoji="1" lang="en-US" altLang="zh-CN" sz="2400" b="1" dirty="0" smtClean="0">
+              <a:rPr kumimoji="1" lang="en-US" altLang="zh-CN" sz="2400" dirty="0" smtClean="0">
                 <a:solidFill>
                   <a:srgbClr val="0E0E0E"/>
                 </a:solidFill>
@@ -17790,7 +17790,7 @@
               </a:rPr>
               <a:t>Label</a:t>
             </a:r>
-            <a:endParaRPr kumimoji="1" lang="zh-CN" altLang="en-US" sz="2400" b="1" dirty="0">
+            <a:endParaRPr kumimoji="1" lang="zh-CN" altLang="en-US" sz="2400" dirty="0">
               <a:solidFill>
                 <a:srgbClr val="0E0E0E"/>
               </a:solidFill>
@@ -17808,7 +17808,7 @@
         </p:nvSpPr>
         <p:spPr>
           <a:xfrm>
-            <a:off x="-1670538" y="1626069"/>
+            <a:off x="-1670538" y="1616676"/>
             <a:ext cx="1318845" cy="872125"/>
           </a:xfrm>
           <a:prstGeom prst="rect">
@@ -17841,10 +17841,11 @@
           <a:p>
             <a:pPr algn="ctr"/>
             <a:r>
-              <a:rPr kumimoji="1" lang="en-US" altLang="zh-CN" sz="2400" b="1" dirty="0" smtClean="0">
+              <a:rPr kumimoji="1" lang="en-US" altLang="zh-CN" sz="2400" dirty="0" smtClean="0">
                 <a:solidFill>
                   <a:srgbClr val="0E0E0E"/>
                 </a:solidFill>
+                <a:effectLst/>
                 <a:latin typeface="Helvetica"/>
                 <a:cs typeface="Helvetica"/>
               </a:rPr>
@@ -17854,19 +17855,21 @@
           <a:p>
             <a:pPr algn="ctr"/>
             <a:r>
-              <a:rPr kumimoji="1" lang="en-US" altLang="zh-CN" sz="2400" b="1" dirty="0" smtClean="0">
+              <a:rPr kumimoji="1" lang="en-US" altLang="zh-CN" sz="2400" dirty="0" smtClean="0">
                 <a:solidFill>
                   <a:srgbClr val="0E0E0E"/>
                 </a:solidFill>
+                <a:effectLst/>
                 <a:latin typeface="Helvetica"/>
                 <a:cs typeface="Helvetica"/>
               </a:rPr>
               <a:t>Label</a:t>
             </a:r>
-            <a:endParaRPr kumimoji="1" lang="zh-CN" altLang="en-US" sz="2400" b="1" dirty="0">
+            <a:endParaRPr kumimoji="1" lang="zh-CN" altLang="en-US" sz="2400" dirty="0">
               <a:solidFill>
                 <a:srgbClr val="0E0E0E"/>
               </a:solidFill>
+              <a:effectLst/>
               <a:latin typeface="Helvetica"/>
               <a:cs typeface="Helvetica"/>
             </a:endParaRPr>
@@ -17926,7 +17929,7 @@
           <p:nvPr>
             <p:extLst>
               <p:ext uri="{D42A27DB-BD31-4B8C-83A1-F6EECF244321}">
-                <p14:modId xmlns:p14="http://schemas.microsoft.com/office/powerpoint/2010/main" val="2799051124"/>
+                <p14:modId xmlns:p14="http://schemas.microsoft.com/office/powerpoint/2010/main" val="1520369561"/>
               </p:ext>
             </p:extLst>
           </p:nvPr>
@@ -17939,7 +17942,7 @@
           <a:graphicData uri="http://schemas.openxmlformats.org/presentationml/2006/ole">
             <mc:AlternateContent xmlns:mc="http://schemas.openxmlformats.org/markup-compatibility/2006">
               <mc:Choice xmlns:v="urn:schemas-microsoft-com:vml" Requires="v">
-                <p:oleObj spid="_x0000_s6145" name="Equation" r:id="rId6" imgW="927100" imgH="330200" progId="Equation.DSMT4">
+                <p:oleObj spid="_x0000_s6153" name="Equation" r:id="rId6" imgW="927100" imgH="330200" progId="Equation.DSMT4">
                   <p:embed/>
                 </p:oleObj>
               </mc:Choice>
@@ -18027,7 +18030,7 @@
           <p:nvPr>
             <p:extLst>
               <p:ext uri="{D42A27DB-BD31-4B8C-83A1-F6EECF244321}">
-                <p14:modId xmlns:p14="http://schemas.microsoft.com/office/powerpoint/2010/main" val="270801184"/>
+                <p14:modId xmlns:p14="http://schemas.microsoft.com/office/powerpoint/2010/main" val="3810380225"/>
               </p:ext>
             </p:extLst>
           </p:nvPr>
@@ -18040,7 +18043,7 @@
           <a:graphicData uri="http://schemas.openxmlformats.org/presentationml/2006/ole">
             <mc:AlternateContent xmlns:mc="http://schemas.openxmlformats.org/markup-compatibility/2006">
               <mc:Choice xmlns:v="urn:schemas-microsoft-com:vml" Requires="v">
-                <p:oleObj spid="_x0000_s6146" name="Equation" r:id="rId8" imgW="901700" imgH="330200" progId="Equation.DSMT4">
+                <p:oleObj spid="_x0000_s6154" name="Equation" r:id="rId8" imgW="901700" imgH="330200" progId="Equation.DSMT4">
                   <p:embed/>
                 </p:oleObj>
               </mc:Choice>
@@ -18084,7 +18087,7 @@
           <p:nvPr>
             <p:extLst>
               <p:ext uri="{D42A27DB-BD31-4B8C-83A1-F6EECF244321}">
-                <p14:modId xmlns:p14="http://schemas.microsoft.com/office/powerpoint/2010/main" val="3275422389"/>
+                <p14:modId xmlns:p14="http://schemas.microsoft.com/office/powerpoint/2010/main" val="257592585"/>
               </p:ext>
             </p:extLst>
           </p:nvPr>
@@ -18097,7 +18100,7 @@
           <a:graphicData uri="http://schemas.openxmlformats.org/presentationml/2006/ole">
             <mc:AlternateContent xmlns:mc="http://schemas.openxmlformats.org/markup-compatibility/2006">
               <mc:Choice xmlns:v="urn:schemas-microsoft-com:vml" Requires="v">
-                <p:oleObj spid="_x0000_s6147" name="Equation" r:id="rId10" imgW="1181100" imgH="393700" progId="Equation.DSMT4">
+                <p:oleObj spid="_x0000_s6155" name="Equation" r:id="rId10" imgW="1181100" imgH="393700" progId="Equation.DSMT4">
                   <p:embed/>
                 </p:oleObj>
               </mc:Choice>
@@ -18141,7 +18144,7 @@
           <p:nvPr>
             <p:extLst>
               <p:ext uri="{D42A27DB-BD31-4B8C-83A1-F6EECF244321}">
-                <p14:modId xmlns:p14="http://schemas.microsoft.com/office/powerpoint/2010/main" val="1904091433"/>
+                <p14:modId xmlns:p14="http://schemas.microsoft.com/office/powerpoint/2010/main" val="1449369564"/>
               </p:ext>
             </p:extLst>
           </p:nvPr>
@@ -18154,7 +18157,7 @@
           <a:graphicData uri="http://schemas.openxmlformats.org/presentationml/2006/ole">
             <mc:AlternateContent xmlns:mc="http://schemas.openxmlformats.org/markup-compatibility/2006">
               <mc:Choice xmlns:v="urn:schemas-microsoft-com:vml" Requires="v">
-                <p:oleObj spid="_x0000_s6148" name="Equation" r:id="rId12" imgW="1168400" imgH="393700" progId="Equation.DSMT4">
+                <p:oleObj spid="_x0000_s6156" name="Equation" r:id="rId12" imgW="1168400" imgH="393700" progId="Equation.DSMT4">
                   <p:embed/>
                 </p:oleObj>
               </mc:Choice>

</xml_diff>

<commit_message>
Final version for camera ready
</commit_message>
<xml_diff>
--- a/figure/make_figures.pptx
+++ b/figure/make_figures.pptx
@@ -294,7 +294,7 @@
           <a:p>
             <a:fld id="{798F1848-DB05-B741-A7B3-4E2AE1CD8CE6}" type="datetimeFigureOut">
               <a:rPr kumimoji="1" lang="zh-CN" altLang="en-US" smtClean="0"/>
-              <a:t>8/4/15</a:t>
+              <a:t>14/4/15</a:t>
             </a:fld>
             <a:endParaRPr kumimoji="1" lang="zh-CN" altLang="en-US"/>
           </a:p>
@@ -464,7 +464,7 @@
           <a:p>
             <a:fld id="{798F1848-DB05-B741-A7B3-4E2AE1CD8CE6}" type="datetimeFigureOut">
               <a:rPr kumimoji="1" lang="zh-CN" altLang="en-US" smtClean="0"/>
-              <a:t>8/4/15</a:t>
+              <a:t>14/4/15</a:t>
             </a:fld>
             <a:endParaRPr kumimoji="1" lang="zh-CN" altLang="en-US"/>
           </a:p>
@@ -644,7 +644,7 @@
           <a:p>
             <a:fld id="{798F1848-DB05-B741-A7B3-4E2AE1CD8CE6}" type="datetimeFigureOut">
               <a:rPr kumimoji="1" lang="zh-CN" altLang="en-US" smtClean="0"/>
-              <a:t>8/4/15</a:t>
+              <a:t>14/4/15</a:t>
             </a:fld>
             <a:endParaRPr kumimoji="1" lang="zh-CN" altLang="en-US"/>
           </a:p>
@@ -814,7 +814,7 @@
           <a:p>
             <a:fld id="{798F1848-DB05-B741-A7B3-4E2AE1CD8CE6}" type="datetimeFigureOut">
               <a:rPr kumimoji="1" lang="zh-CN" altLang="en-US" smtClean="0"/>
-              <a:t>8/4/15</a:t>
+              <a:t>14/4/15</a:t>
             </a:fld>
             <a:endParaRPr kumimoji="1" lang="zh-CN" altLang="en-US"/>
           </a:p>
@@ -1060,7 +1060,7 @@
           <a:p>
             <a:fld id="{798F1848-DB05-B741-A7B3-4E2AE1CD8CE6}" type="datetimeFigureOut">
               <a:rPr kumimoji="1" lang="zh-CN" altLang="en-US" smtClean="0"/>
-              <a:t>8/4/15</a:t>
+              <a:t>14/4/15</a:t>
             </a:fld>
             <a:endParaRPr kumimoji="1" lang="zh-CN" altLang="en-US"/>
           </a:p>
@@ -1348,7 +1348,7 @@
           <a:p>
             <a:fld id="{798F1848-DB05-B741-A7B3-4E2AE1CD8CE6}" type="datetimeFigureOut">
               <a:rPr kumimoji="1" lang="zh-CN" altLang="en-US" smtClean="0"/>
-              <a:t>8/4/15</a:t>
+              <a:t>14/4/15</a:t>
             </a:fld>
             <a:endParaRPr kumimoji="1" lang="zh-CN" altLang="en-US"/>
           </a:p>
@@ -1770,7 +1770,7 @@
           <a:p>
             <a:fld id="{798F1848-DB05-B741-A7B3-4E2AE1CD8CE6}" type="datetimeFigureOut">
               <a:rPr kumimoji="1" lang="zh-CN" altLang="en-US" smtClean="0"/>
-              <a:t>8/4/15</a:t>
+              <a:t>14/4/15</a:t>
             </a:fld>
             <a:endParaRPr kumimoji="1" lang="zh-CN" altLang="en-US"/>
           </a:p>
@@ -1888,7 +1888,7 @@
           <a:p>
             <a:fld id="{798F1848-DB05-B741-A7B3-4E2AE1CD8CE6}" type="datetimeFigureOut">
               <a:rPr kumimoji="1" lang="zh-CN" altLang="en-US" smtClean="0"/>
-              <a:t>8/4/15</a:t>
+              <a:t>14/4/15</a:t>
             </a:fld>
             <a:endParaRPr kumimoji="1" lang="zh-CN" altLang="en-US"/>
           </a:p>
@@ -1983,7 +1983,7 @@
           <a:p>
             <a:fld id="{798F1848-DB05-B741-A7B3-4E2AE1CD8CE6}" type="datetimeFigureOut">
               <a:rPr kumimoji="1" lang="zh-CN" altLang="en-US" smtClean="0"/>
-              <a:t>8/4/15</a:t>
+              <a:t>14/4/15</a:t>
             </a:fld>
             <a:endParaRPr kumimoji="1" lang="zh-CN" altLang="en-US"/>
           </a:p>
@@ -2260,7 +2260,7 @@
           <a:p>
             <a:fld id="{798F1848-DB05-B741-A7B3-4E2AE1CD8CE6}" type="datetimeFigureOut">
               <a:rPr kumimoji="1" lang="zh-CN" altLang="en-US" smtClean="0"/>
-              <a:t>8/4/15</a:t>
+              <a:t>14/4/15</a:t>
             </a:fld>
             <a:endParaRPr kumimoji="1" lang="zh-CN" altLang="en-US"/>
           </a:p>
@@ -2513,7 +2513,7 @@
           <a:p>
             <a:fld id="{798F1848-DB05-B741-A7B3-4E2AE1CD8CE6}" type="datetimeFigureOut">
               <a:rPr kumimoji="1" lang="zh-CN" altLang="en-US" smtClean="0"/>
-              <a:t>8/4/15</a:t>
+              <a:t>14/4/15</a:t>
             </a:fld>
             <a:endParaRPr kumimoji="1" lang="zh-CN" altLang="en-US"/>
           </a:p>
@@ -2726,7 +2726,7 @@
           <a:p>
             <a:fld id="{798F1848-DB05-B741-A7B3-4E2AE1CD8CE6}" type="datetimeFigureOut">
               <a:rPr kumimoji="1" lang="zh-CN" altLang="en-US" smtClean="0"/>
-              <a:t>8/4/15</a:t>
+              <a:t>14/4/15</a:t>
             </a:fld>
             <a:endParaRPr kumimoji="1" lang="zh-CN" altLang="en-US"/>
           </a:p>
@@ -5722,17 +5722,7 @@
                     <a:latin typeface="Helvetica"/>
                     <a:cs typeface="Helvetica"/>
                   </a:rPr>
-                  <a:t>Extract </a:t>
-                </a:r>
-                <a:r>
-                  <a:rPr kumimoji="1" lang="en-US" altLang="zh-CN" sz="3600" b="1" dirty="0" smtClean="0">
-                    <a:solidFill>
-                      <a:srgbClr val="2A69AF"/>
-                    </a:solidFill>
-                    <a:latin typeface="Helvetica"/>
-                    <a:cs typeface="Helvetica"/>
-                  </a:rPr>
-                  <a:t>features</a:t>
+                  <a:t>Extract features</a:t>
                 </a:r>
                 <a:endParaRPr kumimoji="1" lang="zh-CN" altLang="en-US" sz="3600" b="1" dirty="0">
                   <a:solidFill>
@@ -6091,17 +6081,7 @@
                     <a:latin typeface="Helvetica"/>
                     <a:cs typeface="Helvetica"/>
                   </a:rPr>
-                  <a:t>Corrected </a:t>
-                </a:r>
-                <a:r>
-                  <a:rPr kumimoji="1" lang="en-US" altLang="zh-CN" sz="3200" b="1" dirty="0" smtClean="0">
-                    <a:solidFill>
-                      <a:schemeClr val="bg1"/>
-                    </a:solidFill>
-                    <a:latin typeface="Helvetica"/>
-                    <a:cs typeface="Helvetica"/>
-                  </a:rPr>
-                  <a:t>Labels</a:t>
+                  <a:t>Corrected Labels</a:t>
                 </a:r>
                 <a:endParaRPr kumimoji="1" lang="zh-CN" altLang="en-US" sz="3200" b="1" dirty="0">
                   <a:solidFill>
@@ -8250,7 +8230,7 @@
               <a:graphicData uri="http://schemas.openxmlformats.org/presentationml/2006/ole">
                 <mc:AlternateContent xmlns:mc="http://schemas.openxmlformats.org/markup-compatibility/2006">
                   <mc:Choice xmlns:v="urn:schemas-microsoft-com:vml" Requires="v">
-                    <p:oleObj spid="_x0000_s3234" name="Equation" r:id="rId3" imgW="901700" imgH="330200" progId="Equation.DSMT4">
+                    <p:oleObj spid="_x0000_s3247" name="Equation" r:id="rId3" imgW="901700" imgH="330200" progId="Equation.DSMT4">
                       <p:embed/>
                     </p:oleObj>
                   </mc:Choice>
@@ -9091,7 +9071,7 @@
               <a:graphicData uri="http://schemas.openxmlformats.org/presentationml/2006/ole">
                 <mc:AlternateContent xmlns:mc="http://schemas.openxmlformats.org/markup-compatibility/2006">
                   <mc:Choice xmlns:v="urn:schemas-microsoft-com:vml" Requires="v">
-                    <p:oleObj spid="_x0000_s3235" name="Equation" r:id="rId6" imgW="927100" imgH="330200" progId="Equation.DSMT4">
+                    <p:oleObj spid="_x0000_s3248" name="Equation" r:id="rId6" imgW="927100" imgH="330200" progId="Equation.DSMT4">
                       <p:embed/>
                     </p:oleObj>
                   </mc:Choice>
@@ -9488,7 +9468,7 @@
             <a:graphicData uri="http://schemas.openxmlformats.org/presentationml/2006/ole">
               <mc:AlternateContent xmlns:mc="http://schemas.openxmlformats.org/markup-compatibility/2006">
                 <mc:Choice xmlns:v="urn:schemas-microsoft-com:vml" Requires="v">
-                  <p:oleObj spid="_x0000_s3236" name="Equation" r:id="rId8" imgW="1181100" imgH="393700" progId="Equation.DSMT4">
+                  <p:oleObj spid="_x0000_s3249" name="Equation" r:id="rId8" imgW="1181100" imgH="393700" progId="Equation.DSMT4">
                     <p:embed/>
                   </p:oleObj>
                 </mc:Choice>
@@ -9793,7 +9773,7 @@
             <a:graphicData uri="http://schemas.openxmlformats.org/presentationml/2006/ole">
               <mc:AlternateContent xmlns:mc="http://schemas.openxmlformats.org/markup-compatibility/2006">
                 <mc:Choice xmlns:v="urn:schemas-microsoft-com:vml" Requires="v">
-                  <p:oleObj spid="_x0000_s3237" name="Equation" r:id="rId10" imgW="1168400" imgH="393700" progId="Equation.DSMT4">
+                  <p:oleObj spid="_x0000_s3250" name="Equation" r:id="rId10" imgW="1168400" imgH="393700" progId="Equation.DSMT4">
                     <p:embed/>
                   </p:oleObj>
                 </mc:Choice>
@@ -15809,7 +15789,7 @@
           <a:graphicData uri="http://schemas.openxmlformats.org/presentationml/2006/ole">
             <mc:AlternateContent xmlns:mc="http://schemas.openxmlformats.org/markup-compatibility/2006">
               <mc:Choice xmlns:v="urn:schemas-microsoft-com:vml" Requires="v">
-                <p:oleObj spid="_x0000_s1152" name="Equation" r:id="rId7" imgW="927100" imgH="330200" progId="Equation.DSMT4">
+                <p:oleObj spid="_x0000_s1165" name="Equation" r:id="rId7" imgW="927100" imgH="330200" progId="Equation.DSMT4">
                   <p:embed/>
                 </p:oleObj>
               </mc:Choice>
@@ -15910,7 +15890,7 @@
           <a:graphicData uri="http://schemas.openxmlformats.org/presentationml/2006/ole">
             <mc:AlternateContent xmlns:mc="http://schemas.openxmlformats.org/markup-compatibility/2006">
               <mc:Choice xmlns:v="urn:schemas-microsoft-com:vml" Requires="v">
-                <p:oleObj spid="_x0000_s1153" name="Equation" r:id="rId9" imgW="901700" imgH="330200" progId="Equation.DSMT4">
+                <p:oleObj spid="_x0000_s1166" name="Equation" r:id="rId9" imgW="901700" imgH="330200" progId="Equation.DSMT4">
                   <p:embed/>
                 </p:oleObj>
               </mc:Choice>
@@ -15967,7 +15947,7 @@
           <a:graphicData uri="http://schemas.openxmlformats.org/presentationml/2006/ole">
             <mc:AlternateContent xmlns:mc="http://schemas.openxmlformats.org/markup-compatibility/2006">
               <mc:Choice xmlns:v="urn:schemas-microsoft-com:vml" Requires="v">
-                <p:oleObj spid="_x0000_s1154" name="Equation" r:id="rId11" imgW="1181100" imgH="393700" progId="Equation.DSMT4">
+                <p:oleObj spid="_x0000_s1167" name="Equation" r:id="rId11" imgW="1181100" imgH="393700" progId="Equation.DSMT4">
                   <p:embed/>
                 </p:oleObj>
               </mc:Choice>
@@ -16024,7 +16004,7 @@
           <a:graphicData uri="http://schemas.openxmlformats.org/presentationml/2006/ole">
             <mc:AlternateContent xmlns:mc="http://schemas.openxmlformats.org/markup-compatibility/2006">
               <mc:Choice xmlns:v="urn:schemas-microsoft-com:vml" Requires="v">
-                <p:oleObj spid="_x0000_s1155" name="Equation" r:id="rId13" imgW="1168400" imgH="393700" progId="Equation.DSMT4">
+                <p:oleObj spid="_x0000_s1168" name="Equation" r:id="rId13" imgW="1168400" imgH="393700" progId="Equation.DSMT4">
                   <p:embed/>
                 </p:oleObj>
               </mc:Choice>
@@ -17492,742 +17472,771 @@
           <a:chExt cx="0" cy="0"/>
         </a:xfrm>
       </p:grpSpPr>
-      <p:pic>
-        <p:nvPicPr>
-          <p:cNvPr id="2" name="图片 1" descr="00_0199_721919398,2580926292.pdf"/>
-          <p:cNvPicPr>
-            <a:picLocks noChangeAspect="1"/>
-          </p:cNvPicPr>
+      <p:grpSp>
+        <p:nvGrpSpPr>
+          <p:cNvPr id="17" name="组 16"/>
+          <p:cNvGrpSpPr/>
           <p:nvPr/>
-        </p:nvPicPr>
-        <p:blipFill rotWithShape="1">
-          <a:blip r:embed="rId3">
-            <a:extLst>
-              <a:ext uri="{28A0092B-C50C-407E-A947-70E740481C1C}">
-                <a14:useLocalDpi xmlns:a14="http://schemas.microsoft.com/office/drawing/2010/main" val="0"/>
-              </a:ext>
-            </a:extLst>
-          </a:blip>
-          <a:srcRect l="7294" t="5792" r="2963" b="9679"/>
-          <a:stretch/>
-        </p:blipFill>
-        <p:spPr>
+        </p:nvGrpSpPr>
+        <p:grpSpPr>
           <a:xfrm>
-            <a:off x="5239003" y="2598322"/>
-            <a:ext cx="8206016" cy="2576426"/>
+            <a:off x="-3177806" y="-549250"/>
+            <a:ext cx="16622825" cy="5723998"/>
+            <a:chOff x="-3177806" y="-549250"/>
+            <a:chExt cx="16622825" cy="5723998"/>
           </a:xfrm>
-          <a:prstGeom prst="rect">
-            <a:avLst/>
-          </a:prstGeom>
-        </p:spPr>
-      </p:pic>
-      <p:pic>
-        <p:nvPicPr>
-          <p:cNvPr id="3" name="图片 2" descr="00_0541_1183122359,3131008792.pdf"/>
-          <p:cNvPicPr>
-            <a:picLocks noChangeAspect="1"/>
-          </p:cNvPicPr>
-          <p:nvPr/>
-        </p:nvPicPr>
-        <p:blipFill rotWithShape="1">
-          <a:blip r:embed="rId4">
-            <a:extLst>
-              <a:ext uri="{28A0092B-C50C-407E-A947-70E740481C1C}">
-                <a14:useLocalDpi xmlns:a14="http://schemas.microsoft.com/office/drawing/2010/main" val="0"/>
-              </a:ext>
-            </a:extLst>
-          </a:blip>
-          <a:srcRect l="7373" t="5792" r="3144" b="9679"/>
-          <a:stretch/>
-        </p:blipFill>
-        <p:spPr>
-          <a:xfrm>
-            <a:off x="-3074720" y="2598322"/>
-            <a:ext cx="8182338" cy="2576426"/>
-          </a:xfrm>
-          <a:prstGeom prst="rect">
-            <a:avLst/>
-          </a:prstGeom>
-        </p:spPr>
-      </p:pic>
-      <p:pic>
-        <p:nvPicPr>
-          <p:cNvPr id="4" name="图片 3" descr="03_0468_3047218569,1124148079.pdf"/>
-          <p:cNvPicPr>
-            <a:picLocks noChangeAspect="1"/>
-          </p:cNvPicPr>
-          <p:nvPr/>
-        </p:nvPicPr>
-        <p:blipFill rotWithShape="1">
-          <a:blip r:embed="rId5">
-            <a:extLst>
-              <a:ext uri="{28A0092B-C50C-407E-A947-70E740481C1C}">
-                <a14:useLocalDpi xmlns:a14="http://schemas.microsoft.com/office/drawing/2010/main" val="0"/>
-              </a:ext>
-            </a:extLst>
-          </a:blip>
-          <a:srcRect l="7294" t="5460" r="2963" b="10059"/>
-          <a:stretch/>
-        </p:blipFill>
-        <p:spPr>
-          <a:xfrm>
-            <a:off x="5239003" y="-86186"/>
-            <a:ext cx="8206016" cy="2574987"/>
-          </a:xfrm>
-          <a:prstGeom prst="rect">
-            <a:avLst/>
-          </a:prstGeom>
-        </p:spPr>
-      </p:pic>
-      <p:sp>
-        <p:nvSpPr>
-          <p:cNvPr id="5" name="矩形 4"/>
-          <p:cNvSpPr/>
-          <p:nvPr/>
-        </p:nvSpPr>
-        <p:spPr>
-          <a:xfrm>
-            <a:off x="2368074" y="1221155"/>
-            <a:ext cx="2739543" cy="1267646"/>
-          </a:xfrm>
-          <a:prstGeom prst="rect">
-            <a:avLst/>
-          </a:prstGeom>
-          <a:noFill/>
-          <a:ln w="12700" cmpd="sng">
-            <a:solidFill>
-              <a:srgbClr val="0E0E0E"/>
-            </a:solidFill>
-          </a:ln>
-        </p:spPr>
-        <p:style>
-          <a:lnRef idx="1">
-            <a:schemeClr val="accent1"/>
-          </a:lnRef>
-          <a:fillRef idx="3">
-            <a:schemeClr val="accent1"/>
-          </a:fillRef>
-          <a:effectRef idx="2">
-            <a:schemeClr val="accent1"/>
-          </a:effectRef>
-          <a:fontRef idx="minor">
-            <a:schemeClr val="lt1"/>
-          </a:fontRef>
-        </p:style>
-        <p:txBody>
-          <a:bodyPr rtlCol="0" anchor="ctr"/>
-          <a:lstStyle/>
-          <a:p>
-            <a:pPr algn="ctr"/>
-            <a:endParaRPr kumimoji="1" lang="zh-CN" altLang="en-US" dirty="0"/>
-          </a:p>
-        </p:txBody>
-      </p:sp>
-      <p:sp>
-        <p:nvSpPr>
-          <p:cNvPr id="6" name="矩形 5"/>
-          <p:cNvSpPr/>
-          <p:nvPr/>
-        </p:nvSpPr>
-        <p:spPr>
-          <a:xfrm>
-            <a:off x="2368074" y="-87585"/>
-            <a:ext cx="2739544" cy="1308740"/>
-          </a:xfrm>
-          <a:prstGeom prst="rect">
-            <a:avLst/>
-          </a:prstGeom>
-          <a:noFill/>
-          <a:ln w="12700" cmpd="sng">
-            <a:solidFill>
-              <a:srgbClr val="0E0E0E"/>
-            </a:solidFill>
-          </a:ln>
-        </p:spPr>
-        <p:style>
-          <a:lnRef idx="1">
-            <a:schemeClr val="accent1"/>
-          </a:lnRef>
-          <a:fillRef idx="3">
-            <a:schemeClr val="accent1"/>
-          </a:fillRef>
-          <a:effectRef idx="2">
-            <a:schemeClr val="accent1"/>
-          </a:effectRef>
-          <a:fontRef idx="minor">
-            <a:schemeClr val="lt1"/>
-          </a:fontRef>
-        </p:style>
-        <p:txBody>
-          <a:bodyPr rtlCol="0" anchor="ctr"/>
-          <a:lstStyle/>
-          <a:p>
-            <a:pPr algn="ctr"/>
-            <a:endParaRPr kumimoji="1" lang="zh-CN" altLang="en-US" dirty="0"/>
-          </a:p>
-        </p:txBody>
-      </p:sp>
-      <p:sp>
-        <p:nvSpPr>
-          <p:cNvPr id="7" name="矩形 6"/>
-          <p:cNvSpPr/>
-          <p:nvPr/>
-        </p:nvSpPr>
-        <p:spPr>
-          <a:xfrm>
-            <a:off x="-3074720" y="-87585"/>
-            <a:ext cx="2717310" cy="1713654"/>
-          </a:xfrm>
-          <a:prstGeom prst="rect">
-            <a:avLst/>
-          </a:prstGeom>
-          <a:noFill/>
-          <a:ln w="12700" cmpd="sng">
-            <a:solidFill>
-              <a:srgbClr val="0E0E0E"/>
-            </a:solidFill>
-          </a:ln>
-        </p:spPr>
-        <p:style>
-          <a:lnRef idx="1">
-            <a:schemeClr val="accent1"/>
-          </a:lnRef>
-          <a:fillRef idx="3">
-            <a:schemeClr val="accent1"/>
-          </a:fillRef>
-          <a:effectRef idx="2">
-            <a:schemeClr val="accent1"/>
-          </a:effectRef>
-          <a:fontRef idx="minor">
-            <a:schemeClr val="lt1"/>
-          </a:fontRef>
-        </p:style>
-        <p:txBody>
-          <a:bodyPr rtlCol="0" anchor="ctr"/>
-          <a:lstStyle/>
-          <a:p>
-            <a:pPr algn="ctr"/>
-            <a:r>
-              <a:rPr kumimoji="1" lang="en-US" altLang="zh-CN" sz="3200" dirty="0" smtClean="0">
+        </p:grpSpPr>
+        <p:pic>
+          <p:nvPicPr>
+            <p:cNvPr id="2" name="图片 1" descr="00_0199_721919398,2580926292.pdf"/>
+            <p:cNvPicPr>
+              <a:picLocks noChangeAspect="1"/>
+            </p:cNvPicPr>
+            <p:nvPr/>
+          </p:nvPicPr>
+          <p:blipFill rotWithShape="1">
+            <a:blip r:embed="rId3">
+              <a:extLst>
+                <a:ext uri="{28A0092B-C50C-407E-A947-70E740481C1C}">
+                  <a14:useLocalDpi xmlns:a14="http://schemas.microsoft.com/office/drawing/2010/main" val="0"/>
+                </a:ext>
+              </a:extLst>
+            </a:blip>
+            <a:srcRect l="7294" t="5792" r="2963" b="9679"/>
+            <a:stretch/>
+          </p:blipFill>
+          <p:spPr>
+            <a:xfrm>
+              <a:off x="5239003" y="2598322"/>
+              <a:ext cx="8206016" cy="2576426"/>
+            </a:xfrm>
+            <a:prstGeom prst="rect">
+              <a:avLst/>
+            </a:prstGeom>
+          </p:spPr>
+        </p:pic>
+        <p:pic>
+          <p:nvPicPr>
+            <p:cNvPr id="3" name="图片 2" descr="00_0541_1183122359,3131008792.pdf"/>
+            <p:cNvPicPr>
+              <a:picLocks noChangeAspect="1"/>
+            </p:cNvPicPr>
+            <p:nvPr/>
+          </p:nvPicPr>
+          <p:blipFill rotWithShape="1">
+            <a:blip r:embed="rId4">
+              <a:extLst>
+                <a:ext uri="{28A0092B-C50C-407E-A947-70E740481C1C}">
+                  <a14:useLocalDpi xmlns:a14="http://schemas.microsoft.com/office/drawing/2010/main" val="0"/>
+                </a:ext>
+              </a:extLst>
+            </a:blip>
+            <a:srcRect l="7373" t="5792" r="3144" b="9679"/>
+            <a:stretch/>
+          </p:blipFill>
+          <p:spPr>
+            <a:xfrm>
+              <a:off x="-3074720" y="2598322"/>
+              <a:ext cx="8182338" cy="2576426"/>
+            </a:xfrm>
+            <a:prstGeom prst="rect">
+              <a:avLst/>
+            </a:prstGeom>
+          </p:spPr>
+        </p:pic>
+        <p:pic>
+          <p:nvPicPr>
+            <p:cNvPr id="4" name="图片 3" descr="03_0468_3047218569,1124148079.pdf"/>
+            <p:cNvPicPr>
+              <a:picLocks noChangeAspect="1"/>
+            </p:cNvPicPr>
+            <p:nvPr/>
+          </p:nvPicPr>
+          <p:blipFill rotWithShape="1">
+            <a:blip r:embed="rId5">
+              <a:extLst>
+                <a:ext uri="{28A0092B-C50C-407E-A947-70E740481C1C}">
+                  <a14:useLocalDpi xmlns:a14="http://schemas.microsoft.com/office/drawing/2010/main" val="0"/>
+                </a:ext>
+              </a:extLst>
+            </a:blip>
+            <a:srcRect l="7294" t="5460" r="2963" b="10059"/>
+            <a:stretch/>
+          </p:blipFill>
+          <p:spPr>
+            <a:xfrm>
+              <a:off x="5239003" y="-86186"/>
+              <a:ext cx="8206016" cy="2574987"/>
+            </a:xfrm>
+            <a:prstGeom prst="rect">
+              <a:avLst/>
+            </a:prstGeom>
+          </p:spPr>
+        </p:pic>
+        <p:sp>
+          <p:nvSpPr>
+            <p:cNvPr id="5" name="矩形 4"/>
+            <p:cNvSpPr/>
+            <p:nvPr/>
+          </p:nvSpPr>
+          <p:spPr>
+            <a:xfrm>
+              <a:off x="2368074" y="1221155"/>
+              <a:ext cx="2739543" cy="1267646"/>
+            </a:xfrm>
+            <a:prstGeom prst="rect">
+              <a:avLst/>
+            </a:prstGeom>
+            <a:noFill/>
+            <a:ln w="12700" cmpd="sng">
+              <a:solidFill>
+                <a:srgbClr val="0E0E0E"/>
+              </a:solidFill>
+            </a:ln>
+          </p:spPr>
+          <p:style>
+            <a:lnRef idx="1">
+              <a:schemeClr val="accent1"/>
+            </a:lnRef>
+            <a:fillRef idx="3">
+              <a:schemeClr val="accent1"/>
+            </a:fillRef>
+            <a:effectRef idx="2">
+              <a:schemeClr val="accent1"/>
+            </a:effectRef>
+            <a:fontRef idx="minor">
+              <a:schemeClr val="lt1"/>
+            </a:fontRef>
+          </p:style>
+          <p:txBody>
+            <a:bodyPr rtlCol="0" anchor="ctr"/>
+            <a:lstStyle/>
+            <a:p>
+              <a:pPr algn="ctr"/>
+              <a:endParaRPr kumimoji="1" lang="zh-CN" altLang="en-US" dirty="0"/>
+            </a:p>
+          </p:txBody>
+        </p:sp>
+        <p:sp>
+          <p:nvSpPr>
+            <p:cNvPr id="6" name="矩形 5"/>
+            <p:cNvSpPr/>
+            <p:nvPr/>
+          </p:nvSpPr>
+          <p:spPr>
+            <a:xfrm>
+              <a:off x="2368074" y="-87585"/>
+              <a:ext cx="2739544" cy="1308740"/>
+            </a:xfrm>
+            <a:prstGeom prst="rect">
+              <a:avLst/>
+            </a:prstGeom>
+            <a:noFill/>
+            <a:ln w="12700" cmpd="sng">
+              <a:solidFill>
+                <a:srgbClr val="0E0E0E"/>
+              </a:solidFill>
+            </a:ln>
+          </p:spPr>
+          <p:style>
+            <a:lnRef idx="1">
+              <a:schemeClr val="accent1"/>
+            </a:lnRef>
+            <a:fillRef idx="3">
+              <a:schemeClr val="accent1"/>
+            </a:fillRef>
+            <a:effectRef idx="2">
+              <a:schemeClr val="accent1"/>
+            </a:effectRef>
+            <a:fontRef idx="minor">
+              <a:schemeClr val="lt1"/>
+            </a:fontRef>
+          </p:style>
+          <p:txBody>
+            <a:bodyPr rtlCol="0" anchor="ctr"/>
+            <a:lstStyle/>
+            <a:p>
+              <a:pPr algn="ctr"/>
+              <a:endParaRPr kumimoji="1" lang="zh-CN" altLang="en-US" dirty="0"/>
+            </a:p>
+          </p:txBody>
+        </p:sp>
+        <p:sp>
+          <p:nvSpPr>
+            <p:cNvPr id="7" name="矩形 6"/>
+            <p:cNvSpPr/>
+            <p:nvPr/>
+          </p:nvSpPr>
+          <p:spPr>
+            <a:xfrm>
+              <a:off x="-3074720" y="-87585"/>
+              <a:ext cx="2717310" cy="1713654"/>
+            </a:xfrm>
+            <a:prstGeom prst="rect">
+              <a:avLst/>
+            </a:prstGeom>
+            <a:noFill/>
+            <a:ln w="12700" cmpd="sng">
+              <a:solidFill>
+                <a:srgbClr val="0E0E0E"/>
+              </a:solidFill>
+            </a:ln>
+          </p:spPr>
+          <p:style>
+            <a:lnRef idx="1">
+              <a:schemeClr val="accent1"/>
+            </a:lnRef>
+            <a:fillRef idx="3">
+              <a:schemeClr val="accent1"/>
+            </a:fillRef>
+            <a:effectRef idx="2">
+              <a:schemeClr val="accent1"/>
+            </a:effectRef>
+            <a:fontRef idx="minor">
+              <a:schemeClr val="lt1"/>
+            </a:fontRef>
+          </p:style>
+          <p:txBody>
+            <a:bodyPr rtlCol="0" anchor="ctr"/>
+            <a:lstStyle/>
+            <a:p>
+              <a:pPr algn="ctr"/>
+              <a:r>
+                <a:rPr kumimoji="1" lang="en-US" altLang="zh-CN" sz="3200" dirty="0" smtClean="0">
+                  <a:solidFill>
+                    <a:srgbClr val="0E0E0E"/>
+                  </a:solidFill>
+                  <a:latin typeface="Helvetica"/>
+                  <a:cs typeface="Helvetica"/>
+                </a:rPr>
+                <a:t>Image </a:t>
+              </a:r>
+              <a:endParaRPr kumimoji="1" lang="zh-CN" altLang="en-US" sz="3200" dirty="0">
                 <a:solidFill>
                   <a:srgbClr val="0E0E0E"/>
                 </a:solidFill>
                 <a:latin typeface="Helvetica"/>
                 <a:cs typeface="Helvetica"/>
-              </a:rPr>
-              <a:t>Image </a:t>
-            </a:r>
-            <a:endParaRPr kumimoji="1" lang="zh-CN" altLang="en-US" sz="3200" dirty="0">
+              </a:endParaRPr>
+            </a:p>
+          </p:txBody>
+        </p:sp>
+        <p:sp>
+          <p:nvSpPr>
+            <p:cNvPr id="8" name="矩形 7"/>
+            <p:cNvSpPr/>
+            <p:nvPr/>
+          </p:nvSpPr>
+          <p:spPr>
+            <a:xfrm>
+              <a:off x="-3074720" y="1616675"/>
+              <a:ext cx="1404182" cy="872126"/>
+            </a:xfrm>
+            <a:prstGeom prst="rect">
+              <a:avLst/>
+            </a:prstGeom>
+            <a:noFill/>
+            <a:ln w="12700" cmpd="sng">
               <a:solidFill>
                 <a:srgbClr val="0E0E0E"/>
               </a:solidFill>
-              <a:latin typeface="Helvetica"/>
-              <a:cs typeface="Helvetica"/>
-            </a:endParaRPr>
-          </a:p>
-        </p:txBody>
-      </p:sp>
-      <p:sp>
-        <p:nvSpPr>
-          <p:cNvPr id="8" name="矩形 7"/>
-          <p:cNvSpPr/>
-          <p:nvPr/>
-        </p:nvSpPr>
-        <p:spPr>
-          <a:xfrm>
-            <a:off x="-3074720" y="1616675"/>
-            <a:ext cx="1404182" cy="872126"/>
-          </a:xfrm>
-          <a:prstGeom prst="rect">
-            <a:avLst/>
-          </a:prstGeom>
-          <a:noFill/>
-          <a:ln w="12700" cmpd="sng">
-            <a:solidFill>
-              <a:srgbClr val="0E0E0E"/>
-            </a:solidFill>
-          </a:ln>
-        </p:spPr>
-        <p:style>
-          <a:lnRef idx="1">
-            <a:schemeClr val="accent1"/>
-          </a:lnRef>
-          <a:fillRef idx="3">
-            <a:schemeClr val="accent1"/>
-          </a:fillRef>
-          <a:effectRef idx="2">
-            <a:schemeClr val="accent1"/>
-          </a:effectRef>
-          <a:fontRef idx="minor">
-            <a:schemeClr val="lt1"/>
-          </a:fontRef>
-        </p:style>
-        <p:txBody>
-          <a:bodyPr rtlCol="0" anchor="ctr"/>
-          <a:lstStyle/>
-          <a:p>
-            <a:pPr algn="ctr"/>
-            <a:r>
-              <a:rPr kumimoji="1" lang="en-US" altLang="zh-CN" sz="2400" dirty="0" smtClean="0">
+            </a:ln>
+          </p:spPr>
+          <p:style>
+            <a:lnRef idx="1">
+              <a:schemeClr val="accent1"/>
+            </a:lnRef>
+            <a:fillRef idx="3">
+              <a:schemeClr val="accent1"/>
+            </a:fillRef>
+            <a:effectRef idx="2">
+              <a:schemeClr val="accent1"/>
+            </a:effectRef>
+            <a:fontRef idx="minor">
+              <a:schemeClr val="lt1"/>
+            </a:fontRef>
+          </p:style>
+          <p:txBody>
+            <a:bodyPr rtlCol="0" anchor="ctr"/>
+            <a:lstStyle/>
+            <a:p>
+              <a:pPr algn="ctr"/>
+              <a:r>
+                <a:rPr kumimoji="1" lang="en-US" altLang="zh-CN" sz="2400" dirty="0" smtClean="0">
+                  <a:solidFill>
+                    <a:srgbClr val="0E0E0E"/>
+                  </a:solidFill>
+                  <a:latin typeface="Helvetica"/>
+                  <a:cs typeface="Helvetica"/>
+                </a:rPr>
+                <a:t>Noisy</a:t>
+              </a:r>
+            </a:p>
+            <a:p>
+              <a:pPr algn="ctr"/>
+              <a:r>
+                <a:rPr kumimoji="1" lang="en-US" altLang="zh-CN" sz="2400" dirty="0" smtClean="0">
+                  <a:solidFill>
+                    <a:srgbClr val="0E0E0E"/>
+                  </a:solidFill>
+                  <a:latin typeface="Helvetica"/>
+                  <a:cs typeface="Helvetica"/>
+                </a:rPr>
+                <a:t>Label</a:t>
+              </a:r>
+              <a:endParaRPr kumimoji="1" lang="zh-CN" altLang="en-US" sz="2400" dirty="0">
                 <a:solidFill>
                   <a:srgbClr val="0E0E0E"/>
                 </a:solidFill>
                 <a:latin typeface="Helvetica"/>
                 <a:cs typeface="Helvetica"/>
-              </a:rPr>
-              <a:t>Noisy</a:t>
-            </a:r>
-          </a:p>
-          <a:p>
-            <a:pPr algn="ctr"/>
-            <a:r>
-              <a:rPr kumimoji="1" lang="en-US" altLang="zh-CN" sz="2400" dirty="0" smtClean="0">
-                <a:solidFill>
-                  <a:srgbClr val="0E0E0E"/>
-                </a:solidFill>
-                <a:latin typeface="Helvetica"/>
-                <a:cs typeface="Helvetica"/>
-              </a:rPr>
-              <a:t>Label</a:t>
-            </a:r>
-            <a:endParaRPr kumimoji="1" lang="zh-CN" altLang="en-US" sz="2400" dirty="0">
+              </a:endParaRPr>
+            </a:p>
+          </p:txBody>
+        </p:sp>
+        <p:sp>
+          <p:nvSpPr>
+            <p:cNvPr id="9" name="矩形 8"/>
+            <p:cNvSpPr/>
+            <p:nvPr/>
+          </p:nvSpPr>
+          <p:spPr>
+            <a:xfrm>
+              <a:off x="-1670538" y="1616676"/>
+              <a:ext cx="1318845" cy="872125"/>
+            </a:xfrm>
+            <a:prstGeom prst="rect">
+              <a:avLst/>
+            </a:prstGeom>
+            <a:noFill/>
+            <a:ln w="12700" cmpd="sng">
               <a:solidFill>
                 <a:srgbClr val="0E0E0E"/>
               </a:solidFill>
-              <a:latin typeface="Helvetica"/>
-              <a:cs typeface="Helvetica"/>
-            </a:endParaRPr>
-          </a:p>
-        </p:txBody>
-      </p:sp>
-      <p:sp>
-        <p:nvSpPr>
-          <p:cNvPr id="9" name="矩形 8"/>
-          <p:cNvSpPr/>
-          <p:nvPr/>
-        </p:nvSpPr>
-        <p:spPr>
-          <a:xfrm>
-            <a:off x="-1670538" y="1616676"/>
-            <a:ext cx="1318845" cy="872125"/>
-          </a:xfrm>
-          <a:prstGeom prst="rect">
-            <a:avLst/>
-          </a:prstGeom>
-          <a:noFill/>
-          <a:ln w="12700" cmpd="sng">
-            <a:solidFill>
-              <a:srgbClr val="0E0E0E"/>
-            </a:solidFill>
-          </a:ln>
-        </p:spPr>
-        <p:style>
-          <a:lnRef idx="1">
-            <a:schemeClr val="accent1"/>
-          </a:lnRef>
-          <a:fillRef idx="3">
-            <a:schemeClr val="accent1"/>
-          </a:fillRef>
-          <a:effectRef idx="2">
-            <a:schemeClr val="accent1"/>
-          </a:effectRef>
-          <a:fontRef idx="minor">
-            <a:schemeClr val="lt1"/>
-          </a:fontRef>
-        </p:style>
-        <p:txBody>
-          <a:bodyPr rtlCol="0" anchor="ctr"/>
-          <a:lstStyle/>
-          <a:p>
-            <a:pPr algn="ctr"/>
-            <a:r>
-              <a:rPr kumimoji="1" lang="en-US" altLang="zh-CN" sz="2400" dirty="0" smtClean="0">
+            </a:ln>
+          </p:spPr>
+          <p:style>
+            <a:lnRef idx="1">
+              <a:schemeClr val="accent1"/>
+            </a:lnRef>
+            <a:fillRef idx="3">
+              <a:schemeClr val="accent1"/>
+            </a:fillRef>
+            <a:effectRef idx="2">
+              <a:schemeClr val="accent1"/>
+            </a:effectRef>
+            <a:fontRef idx="minor">
+              <a:schemeClr val="lt1"/>
+            </a:fontRef>
+          </p:style>
+          <p:txBody>
+            <a:bodyPr rtlCol="0" anchor="ctr"/>
+            <a:lstStyle/>
+            <a:p>
+              <a:pPr algn="ctr"/>
+              <a:r>
+                <a:rPr kumimoji="1" lang="en-US" altLang="zh-CN" sz="2400" dirty="0" smtClean="0">
+                  <a:solidFill>
+                    <a:srgbClr val="0E0E0E"/>
+                  </a:solidFill>
+                  <a:effectLst/>
+                  <a:latin typeface="Helvetica"/>
+                  <a:cs typeface="Helvetica"/>
+                </a:rPr>
+                <a:t>True</a:t>
+              </a:r>
+            </a:p>
+            <a:p>
+              <a:pPr algn="ctr"/>
+              <a:r>
+                <a:rPr kumimoji="1" lang="en-US" altLang="zh-CN" sz="2400" dirty="0" smtClean="0">
+                  <a:solidFill>
+                    <a:srgbClr val="0E0E0E"/>
+                  </a:solidFill>
+                  <a:effectLst/>
+                  <a:latin typeface="Helvetica"/>
+                  <a:cs typeface="Helvetica"/>
+                </a:rPr>
+                <a:t>Label</a:t>
+              </a:r>
+              <a:endParaRPr kumimoji="1" lang="zh-CN" altLang="en-US" sz="2400" dirty="0">
                 <a:solidFill>
                   <a:srgbClr val="0E0E0E"/>
                 </a:solidFill>
                 <a:effectLst/>
                 <a:latin typeface="Helvetica"/>
                 <a:cs typeface="Helvetica"/>
-              </a:rPr>
-              <a:t>True</a:t>
-            </a:r>
-          </a:p>
-          <a:p>
-            <a:pPr algn="ctr"/>
-            <a:r>
-              <a:rPr kumimoji="1" lang="en-US" altLang="zh-CN" sz="2400" dirty="0" smtClean="0">
-                <a:solidFill>
-                  <a:srgbClr val="0E0E0E"/>
-                </a:solidFill>
-                <a:effectLst/>
-                <a:latin typeface="Helvetica"/>
-                <a:cs typeface="Helvetica"/>
-              </a:rPr>
-              <a:t>Label</a:t>
-            </a:r>
-            <a:endParaRPr kumimoji="1" lang="zh-CN" altLang="en-US" sz="2400" dirty="0">
+              </a:endParaRPr>
+            </a:p>
+          </p:txBody>
+        </p:sp>
+        <p:sp>
+          <p:nvSpPr>
+            <p:cNvPr id="10" name="矩形 9"/>
+            <p:cNvSpPr/>
+            <p:nvPr/>
+          </p:nvSpPr>
+          <p:spPr>
+            <a:xfrm>
+              <a:off x="-351692" y="-87585"/>
+              <a:ext cx="2719766" cy="1308740"/>
+            </a:xfrm>
+            <a:prstGeom prst="rect">
+              <a:avLst/>
+            </a:prstGeom>
+            <a:noFill/>
+            <a:ln w="12700" cmpd="sng">
               <a:solidFill>
                 <a:srgbClr val="0E0E0E"/>
               </a:solidFill>
-              <a:effectLst/>
-              <a:latin typeface="Helvetica"/>
-              <a:cs typeface="Helvetica"/>
-            </a:endParaRPr>
-          </a:p>
-        </p:txBody>
-      </p:sp>
-      <p:sp>
-        <p:nvSpPr>
-          <p:cNvPr id="10" name="矩形 9"/>
-          <p:cNvSpPr/>
-          <p:nvPr/>
-        </p:nvSpPr>
-        <p:spPr>
-          <a:xfrm>
-            <a:off x="-351692" y="-87585"/>
-            <a:ext cx="2719766" cy="1308740"/>
-          </a:xfrm>
-          <a:prstGeom prst="rect">
-            <a:avLst/>
-          </a:prstGeom>
-          <a:noFill/>
-          <a:ln w="12700" cmpd="sng">
-            <a:solidFill>
-              <a:srgbClr val="0E0E0E"/>
-            </a:solidFill>
-          </a:ln>
-        </p:spPr>
-        <p:style>
-          <a:lnRef idx="1">
-            <a:schemeClr val="accent1"/>
-          </a:lnRef>
-          <a:fillRef idx="3">
-            <a:schemeClr val="accent1"/>
-          </a:fillRef>
-          <a:effectRef idx="2">
-            <a:schemeClr val="accent1"/>
-          </a:effectRef>
-          <a:fontRef idx="minor">
-            <a:schemeClr val="lt1"/>
-          </a:fontRef>
-        </p:style>
-        <p:txBody>
-          <a:bodyPr rtlCol="0" anchor="ctr"/>
-          <a:lstStyle/>
-          <a:p>
-            <a:pPr algn="ctr"/>
-            <a:endParaRPr kumimoji="1" lang="zh-CN" altLang="en-US" dirty="0"/>
-          </a:p>
-        </p:txBody>
-      </p:sp>
-      <p:graphicFrame>
-        <p:nvGraphicFramePr>
-          <p:cNvPr id="11" name="对象 10"/>
-          <p:cNvGraphicFramePr>
-            <a:graphicFrameLocks noChangeAspect="1"/>
-          </p:cNvGraphicFramePr>
-          <p:nvPr>
-            <p:extLst>
-              <p:ext uri="{D42A27DB-BD31-4B8C-83A1-F6EECF244321}">
-                <p14:modId xmlns:p14="http://schemas.microsoft.com/office/powerpoint/2010/main" val="1520369561"/>
-              </p:ext>
-            </p:extLst>
-          </p:nvPr>
-        </p:nvGraphicFramePr>
-        <p:xfrm>
-          <a:off x="264554" y="358534"/>
-          <a:ext cx="1466632" cy="457817"/>
-        </p:xfrm>
-        <a:graphic>
-          <a:graphicData uri="http://schemas.openxmlformats.org/presentationml/2006/ole">
-            <mc:AlternateContent xmlns:mc="http://schemas.openxmlformats.org/markup-compatibility/2006">
-              <mc:Choice xmlns:v="urn:schemas-microsoft-com:vml" Requires="v">
-                <p:oleObj spid="_x0000_s6153" name="Equation" r:id="rId6" imgW="927100" imgH="330200" progId="Equation.DSMT4">
-                  <p:embed/>
-                </p:oleObj>
-              </mc:Choice>
-              <mc:Fallback>
-                <p:oleObj name="Equation" r:id="rId6" imgW="927100" imgH="330200" progId="Equation.DSMT4">
-                  <p:embed/>
-                  <p:pic>
-                    <p:nvPicPr>
-                      <p:cNvPr id="0" name=""/>
-                      <p:cNvPicPr/>
-                      <p:nvPr/>
-                    </p:nvPicPr>
-                    <p:blipFill>
-                      <a:blip r:embed="rId7"/>
-                      <a:stretch>
-                        <a:fillRect/>
-                      </a:stretch>
-                    </p:blipFill>
-                    <p:spPr>
-                      <a:xfrm>
-                        <a:off x="264554" y="358534"/>
-                        <a:ext cx="1466632" cy="457817"/>
-                      </a:xfrm>
-                      <a:prstGeom prst="rect">
-                        <a:avLst/>
-                      </a:prstGeom>
-                    </p:spPr>
-                  </p:pic>
-                </p:oleObj>
-              </mc:Fallback>
-            </mc:AlternateContent>
-          </a:graphicData>
-        </a:graphic>
-      </p:graphicFrame>
-      <p:sp>
-        <p:nvSpPr>
-          <p:cNvPr id="12" name="矩形 11"/>
-          <p:cNvSpPr/>
-          <p:nvPr/>
-        </p:nvSpPr>
-        <p:spPr>
-          <a:xfrm>
-            <a:off x="-351692" y="1221155"/>
-            <a:ext cx="2719766" cy="1267646"/>
-          </a:xfrm>
-          <a:prstGeom prst="rect">
-            <a:avLst/>
-          </a:prstGeom>
-          <a:noFill/>
-          <a:ln w="12700" cmpd="sng">
-            <a:solidFill>
-              <a:srgbClr val="0E0E0E"/>
-            </a:solidFill>
-          </a:ln>
-        </p:spPr>
-        <p:style>
-          <a:lnRef idx="1">
-            <a:schemeClr val="accent1"/>
-          </a:lnRef>
-          <a:fillRef idx="3">
-            <a:schemeClr val="accent1"/>
-          </a:fillRef>
-          <a:effectRef idx="2">
-            <a:schemeClr val="accent1"/>
-          </a:effectRef>
-          <a:fontRef idx="minor">
-            <a:schemeClr val="lt1"/>
-          </a:fontRef>
-        </p:style>
-        <p:txBody>
-          <a:bodyPr rtlCol="0" anchor="ctr"/>
-          <a:lstStyle/>
-          <a:p>
-            <a:pPr algn="ctr"/>
-            <a:endParaRPr kumimoji="1" lang="zh-CN" altLang="en-US" dirty="0"/>
-          </a:p>
-        </p:txBody>
-      </p:sp>
-      <p:graphicFrame>
-        <p:nvGraphicFramePr>
-          <p:cNvPr id="13" name="对象 12"/>
-          <p:cNvGraphicFramePr>
-            <a:graphicFrameLocks noChangeAspect="1"/>
-          </p:cNvGraphicFramePr>
-          <p:nvPr>
-            <p:extLst>
-              <p:ext uri="{D42A27DB-BD31-4B8C-83A1-F6EECF244321}">
-                <p14:modId xmlns:p14="http://schemas.microsoft.com/office/powerpoint/2010/main" val="3810380225"/>
-              </p:ext>
-            </p:extLst>
-          </p:nvPr>
-        </p:nvGraphicFramePr>
-        <p:xfrm>
-          <a:off x="294966" y="1626070"/>
-          <a:ext cx="1426451" cy="457817"/>
-        </p:xfrm>
-        <a:graphic>
-          <a:graphicData uri="http://schemas.openxmlformats.org/presentationml/2006/ole">
-            <mc:AlternateContent xmlns:mc="http://schemas.openxmlformats.org/markup-compatibility/2006">
-              <mc:Choice xmlns:v="urn:schemas-microsoft-com:vml" Requires="v">
-                <p:oleObj spid="_x0000_s6154" name="Equation" r:id="rId8" imgW="901700" imgH="330200" progId="Equation.DSMT4">
-                  <p:embed/>
-                </p:oleObj>
-              </mc:Choice>
-              <mc:Fallback>
-                <p:oleObj name="Equation" r:id="rId8" imgW="901700" imgH="330200" progId="Equation.DSMT4">
-                  <p:embed/>
-                  <p:pic>
-                    <p:nvPicPr>
-                      <p:cNvPr id="0" name=""/>
-                      <p:cNvPicPr/>
-                      <p:nvPr/>
-                    </p:nvPicPr>
-                    <p:blipFill>
-                      <a:blip r:embed="rId9"/>
-                      <a:stretch>
-                        <a:fillRect/>
-                      </a:stretch>
-                    </p:blipFill>
-                    <p:spPr>
-                      <a:xfrm>
-                        <a:off x="294966" y="1626070"/>
-                        <a:ext cx="1426451" cy="457817"/>
-                      </a:xfrm>
-                      <a:prstGeom prst="rect">
-                        <a:avLst/>
-                      </a:prstGeom>
-                    </p:spPr>
-                  </p:pic>
-                </p:oleObj>
-              </mc:Fallback>
-            </mc:AlternateContent>
-          </a:graphicData>
-        </a:graphic>
-      </p:graphicFrame>
-      <p:graphicFrame>
-        <p:nvGraphicFramePr>
-          <p:cNvPr id="14" name="对象 13"/>
-          <p:cNvGraphicFramePr>
-            <a:graphicFrameLocks noChangeAspect="1"/>
-          </p:cNvGraphicFramePr>
-          <p:nvPr>
-            <p:extLst>
-              <p:ext uri="{D42A27DB-BD31-4B8C-83A1-F6EECF244321}">
-                <p14:modId xmlns:p14="http://schemas.microsoft.com/office/powerpoint/2010/main" val="257592585"/>
-              </p:ext>
-            </p:extLst>
-          </p:nvPr>
-        </p:nvGraphicFramePr>
-        <p:xfrm>
-          <a:off x="2793575" y="260724"/>
-          <a:ext cx="1868449" cy="545858"/>
-        </p:xfrm>
-        <a:graphic>
-          <a:graphicData uri="http://schemas.openxmlformats.org/presentationml/2006/ole">
-            <mc:AlternateContent xmlns:mc="http://schemas.openxmlformats.org/markup-compatibility/2006">
-              <mc:Choice xmlns:v="urn:schemas-microsoft-com:vml" Requires="v">
-                <p:oleObj spid="_x0000_s6155" name="Equation" r:id="rId10" imgW="1181100" imgH="393700" progId="Equation.DSMT4">
-                  <p:embed/>
-                </p:oleObj>
-              </mc:Choice>
-              <mc:Fallback>
-                <p:oleObj name="Equation" r:id="rId10" imgW="1181100" imgH="393700" progId="Equation.DSMT4">
-                  <p:embed/>
-                  <p:pic>
-                    <p:nvPicPr>
-                      <p:cNvPr id="0" name=""/>
-                      <p:cNvPicPr/>
-                      <p:nvPr/>
-                    </p:nvPicPr>
-                    <p:blipFill>
-                      <a:blip r:embed="rId11"/>
-                      <a:stretch>
-                        <a:fillRect/>
-                      </a:stretch>
-                    </p:blipFill>
-                    <p:spPr>
-                      <a:xfrm>
-                        <a:off x="2793575" y="260724"/>
-                        <a:ext cx="1868449" cy="545858"/>
-                      </a:xfrm>
-                      <a:prstGeom prst="rect">
-                        <a:avLst/>
-                      </a:prstGeom>
-                    </p:spPr>
-                  </p:pic>
-                </p:oleObj>
-              </mc:Fallback>
-            </mc:AlternateContent>
-          </a:graphicData>
-        </a:graphic>
-      </p:graphicFrame>
-      <p:graphicFrame>
-        <p:nvGraphicFramePr>
-          <p:cNvPr id="15" name="对象 14"/>
-          <p:cNvGraphicFramePr>
-            <a:graphicFrameLocks noChangeAspect="1"/>
-          </p:cNvGraphicFramePr>
-          <p:nvPr>
-            <p:extLst>
-              <p:ext uri="{D42A27DB-BD31-4B8C-83A1-F6EECF244321}">
-                <p14:modId xmlns:p14="http://schemas.microsoft.com/office/powerpoint/2010/main" val="1449369564"/>
-              </p:ext>
-            </p:extLst>
-          </p:nvPr>
-        </p:nvGraphicFramePr>
-        <p:xfrm>
-          <a:off x="2813666" y="1538029"/>
-          <a:ext cx="1848358" cy="545858"/>
-        </p:xfrm>
-        <a:graphic>
-          <a:graphicData uri="http://schemas.openxmlformats.org/presentationml/2006/ole">
-            <mc:AlternateContent xmlns:mc="http://schemas.openxmlformats.org/markup-compatibility/2006">
-              <mc:Choice xmlns:v="urn:schemas-microsoft-com:vml" Requires="v">
-                <p:oleObj spid="_x0000_s6156" name="Equation" r:id="rId12" imgW="1168400" imgH="393700" progId="Equation.DSMT4">
-                  <p:embed/>
-                </p:oleObj>
-              </mc:Choice>
-              <mc:Fallback>
-                <p:oleObj name="Equation" r:id="rId12" imgW="1168400" imgH="393700" progId="Equation.DSMT4">
-                  <p:embed/>
-                  <p:pic>
-                    <p:nvPicPr>
-                      <p:cNvPr id="0" name=""/>
-                      <p:cNvPicPr/>
-                      <p:nvPr/>
-                    </p:nvPicPr>
-                    <p:blipFill>
-                      <a:blip r:embed="rId13"/>
-                      <a:stretch>
-                        <a:fillRect/>
-                      </a:stretch>
-                    </p:blipFill>
-                    <p:spPr>
-                      <a:xfrm>
-                        <a:off x="2813666" y="1538029"/>
-                        <a:ext cx="1848358" cy="545858"/>
-                      </a:xfrm>
-                      <a:prstGeom prst="rect">
-                        <a:avLst/>
-                      </a:prstGeom>
-                    </p:spPr>
-                  </p:pic>
-                </p:oleObj>
-              </mc:Fallback>
-            </mc:AlternateContent>
-          </a:graphicData>
-        </a:graphic>
-      </p:graphicFrame>
-      <p:sp>
-        <p:nvSpPr>
-          <p:cNvPr id="16" name="文本框 15"/>
-          <p:cNvSpPr txBox="1"/>
-          <p:nvPr/>
-        </p:nvSpPr>
-        <p:spPr>
-          <a:xfrm>
-            <a:off x="-3177806" y="-549250"/>
-            <a:ext cx="2993127" cy="461665"/>
-          </a:xfrm>
-          <a:prstGeom prst="rect">
-            <a:avLst/>
-          </a:prstGeom>
-          <a:noFill/>
-        </p:spPr>
-        <p:txBody>
-          <a:bodyPr wrap="none" rtlCol="0">
-            <a:spAutoFit/>
-          </a:bodyPr>
-          <a:lstStyle/>
-          <a:p>
-            <a:r>
-              <a:rPr kumimoji="1" lang="en-US" altLang="zh-CN" sz="2400" dirty="0" smtClean="0">
+            </a:ln>
+          </p:spPr>
+          <p:style>
+            <a:lnRef idx="1">
+              <a:schemeClr val="accent1"/>
+            </a:lnRef>
+            <a:fillRef idx="3">
+              <a:schemeClr val="accent1"/>
+            </a:fillRef>
+            <a:effectRef idx="2">
+              <a:schemeClr val="accent1"/>
+            </a:effectRef>
+            <a:fontRef idx="minor">
+              <a:schemeClr val="lt1"/>
+            </a:fontRef>
+          </p:style>
+          <p:txBody>
+            <a:bodyPr rtlCol="0" anchor="ctr"/>
+            <a:lstStyle/>
+            <a:p>
+              <a:pPr algn="ctr"/>
+              <a:endParaRPr kumimoji="1" lang="zh-CN" altLang="en-US" dirty="0"/>
+            </a:p>
+          </p:txBody>
+        </p:sp>
+        <p:graphicFrame>
+          <p:nvGraphicFramePr>
+            <p:cNvPr id="11" name="对象 10"/>
+            <p:cNvGraphicFramePr>
+              <a:graphicFrameLocks noChangeAspect="1"/>
+            </p:cNvGraphicFramePr>
+            <p:nvPr>
+              <p:extLst>
+                <p:ext uri="{D42A27DB-BD31-4B8C-83A1-F6EECF244321}">
+                  <p14:modId xmlns:p14="http://schemas.microsoft.com/office/powerpoint/2010/main" val="1824321070"/>
+                </p:ext>
+              </p:extLst>
+            </p:nvPr>
+          </p:nvGraphicFramePr>
+          <p:xfrm>
+            <a:off x="264554" y="358534"/>
+            <a:ext cx="1466632" cy="457817"/>
+          </p:xfrm>
+          <a:graphic>
+            <a:graphicData uri="http://schemas.openxmlformats.org/presentationml/2006/ole">
+              <mc:AlternateContent xmlns:mc="http://schemas.openxmlformats.org/markup-compatibility/2006">
+                <mc:Choice xmlns:v="urn:schemas-microsoft-com:vml" Requires="v">
+                  <p:oleObj spid="_x0000_s6166" name="Equation" r:id="rId6" imgW="927100" imgH="330200" progId="Equation.DSMT4">
+                    <p:embed/>
+                  </p:oleObj>
+                </mc:Choice>
+                <mc:Fallback>
+                  <p:oleObj name="Equation" r:id="rId6" imgW="927100" imgH="330200" progId="Equation.DSMT4">
+                    <p:embed/>
+                    <p:pic>
+                      <p:nvPicPr>
+                        <p:cNvPr id="0" name=""/>
+                        <p:cNvPicPr/>
+                        <p:nvPr/>
+                      </p:nvPicPr>
+                      <p:blipFill>
+                        <a:blip r:embed="rId7"/>
+                        <a:stretch>
+                          <a:fillRect/>
+                        </a:stretch>
+                      </p:blipFill>
+                      <p:spPr>
+                        <a:xfrm>
+                          <a:off x="264554" y="358534"/>
+                          <a:ext cx="1466632" cy="457817"/>
+                        </a:xfrm>
+                        <a:prstGeom prst="rect">
+                          <a:avLst/>
+                        </a:prstGeom>
+                      </p:spPr>
+                    </p:pic>
+                  </p:oleObj>
+                </mc:Fallback>
+              </mc:AlternateContent>
+            </a:graphicData>
+          </a:graphic>
+        </p:graphicFrame>
+        <p:sp>
+          <p:nvSpPr>
+            <p:cNvPr id="12" name="矩形 11"/>
+            <p:cNvSpPr/>
+            <p:nvPr/>
+          </p:nvSpPr>
+          <p:spPr>
+            <a:xfrm>
+              <a:off x="-351692" y="1221155"/>
+              <a:ext cx="2719766" cy="1267646"/>
+            </a:xfrm>
+            <a:prstGeom prst="rect">
+              <a:avLst/>
+            </a:prstGeom>
+            <a:noFill/>
+            <a:ln w="12700" cmpd="sng">
+              <a:solidFill>
+                <a:srgbClr val="0E0E0E"/>
+              </a:solidFill>
+            </a:ln>
+          </p:spPr>
+          <p:style>
+            <a:lnRef idx="1">
+              <a:schemeClr val="accent1"/>
+            </a:lnRef>
+            <a:fillRef idx="3">
+              <a:schemeClr val="accent1"/>
+            </a:fillRef>
+            <a:effectRef idx="2">
+              <a:schemeClr val="accent1"/>
+            </a:effectRef>
+            <a:fontRef idx="minor">
+              <a:schemeClr val="lt1"/>
+            </a:fontRef>
+          </p:style>
+          <p:txBody>
+            <a:bodyPr rtlCol="0" anchor="ctr"/>
+            <a:lstStyle/>
+            <a:p>
+              <a:pPr algn="ctr"/>
+              <a:endParaRPr kumimoji="1" lang="zh-CN" altLang="en-US" dirty="0"/>
+            </a:p>
+          </p:txBody>
+        </p:sp>
+        <p:graphicFrame>
+          <p:nvGraphicFramePr>
+            <p:cNvPr id="13" name="对象 12"/>
+            <p:cNvGraphicFramePr>
+              <a:graphicFrameLocks noChangeAspect="1"/>
+            </p:cNvGraphicFramePr>
+            <p:nvPr>
+              <p:extLst>
+                <p:ext uri="{D42A27DB-BD31-4B8C-83A1-F6EECF244321}">
+                  <p14:modId xmlns:p14="http://schemas.microsoft.com/office/powerpoint/2010/main" val="2471921588"/>
+                </p:ext>
+              </p:extLst>
+            </p:nvPr>
+          </p:nvGraphicFramePr>
+          <p:xfrm>
+            <a:off x="294966" y="1626070"/>
+            <a:ext cx="1426451" cy="457817"/>
+          </p:xfrm>
+          <a:graphic>
+            <a:graphicData uri="http://schemas.openxmlformats.org/presentationml/2006/ole">
+              <mc:AlternateContent xmlns:mc="http://schemas.openxmlformats.org/markup-compatibility/2006">
+                <mc:Choice xmlns:v="urn:schemas-microsoft-com:vml" Requires="v">
+                  <p:oleObj spid="_x0000_s6167" name="Equation" r:id="rId8" imgW="901700" imgH="330200" progId="Equation.DSMT4">
+                    <p:embed/>
+                  </p:oleObj>
+                </mc:Choice>
+                <mc:Fallback>
+                  <p:oleObj name="Equation" r:id="rId8" imgW="901700" imgH="330200" progId="Equation.DSMT4">
+                    <p:embed/>
+                    <p:pic>
+                      <p:nvPicPr>
+                        <p:cNvPr id="0" name=""/>
+                        <p:cNvPicPr/>
+                        <p:nvPr/>
+                      </p:nvPicPr>
+                      <p:blipFill>
+                        <a:blip r:embed="rId9"/>
+                        <a:stretch>
+                          <a:fillRect/>
+                        </a:stretch>
+                      </p:blipFill>
+                      <p:spPr>
+                        <a:xfrm>
+                          <a:off x="294966" y="1626070"/>
+                          <a:ext cx="1426451" cy="457817"/>
+                        </a:xfrm>
+                        <a:prstGeom prst="rect">
+                          <a:avLst/>
+                        </a:prstGeom>
+                      </p:spPr>
+                    </p:pic>
+                  </p:oleObj>
+                </mc:Fallback>
+              </mc:AlternateContent>
+            </a:graphicData>
+          </a:graphic>
+        </p:graphicFrame>
+        <p:graphicFrame>
+          <p:nvGraphicFramePr>
+            <p:cNvPr id="14" name="对象 13"/>
+            <p:cNvGraphicFramePr>
+              <a:graphicFrameLocks noChangeAspect="1"/>
+            </p:cNvGraphicFramePr>
+            <p:nvPr>
+              <p:extLst>
+                <p:ext uri="{D42A27DB-BD31-4B8C-83A1-F6EECF244321}">
+                  <p14:modId xmlns:p14="http://schemas.microsoft.com/office/powerpoint/2010/main" val="4263457502"/>
+                </p:ext>
+              </p:extLst>
+            </p:nvPr>
+          </p:nvGraphicFramePr>
+          <p:xfrm>
+            <a:off x="2793575" y="260724"/>
+            <a:ext cx="1868449" cy="545858"/>
+          </p:xfrm>
+          <a:graphic>
+            <a:graphicData uri="http://schemas.openxmlformats.org/presentationml/2006/ole">
+              <mc:AlternateContent xmlns:mc="http://schemas.openxmlformats.org/markup-compatibility/2006">
+                <mc:Choice xmlns:v="urn:schemas-microsoft-com:vml" Requires="v">
+                  <p:oleObj spid="_x0000_s6168" name="Equation" r:id="rId10" imgW="1181100" imgH="393700" progId="Equation.DSMT4">
+                    <p:embed/>
+                  </p:oleObj>
+                </mc:Choice>
+                <mc:Fallback>
+                  <p:oleObj name="Equation" r:id="rId10" imgW="1181100" imgH="393700" progId="Equation.DSMT4">
+                    <p:embed/>
+                    <p:pic>
+                      <p:nvPicPr>
+                        <p:cNvPr id="0" name=""/>
+                        <p:cNvPicPr/>
+                        <p:nvPr/>
+                      </p:nvPicPr>
+                      <p:blipFill>
+                        <a:blip r:embed="rId11"/>
+                        <a:stretch>
+                          <a:fillRect/>
+                        </a:stretch>
+                      </p:blipFill>
+                      <p:spPr>
+                        <a:xfrm>
+                          <a:off x="2793575" y="260724"/>
+                          <a:ext cx="1868449" cy="545858"/>
+                        </a:xfrm>
+                        <a:prstGeom prst="rect">
+                          <a:avLst/>
+                        </a:prstGeom>
+                      </p:spPr>
+                    </p:pic>
+                  </p:oleObj>
+                </mc:Fallback>
+              </mc:AlternateContent>
+            </a:graphicData>
+          </a:graphic>
+        </p:graphicFrame>
+        <p:graphicFrame>
+          <p:nvGraphicFramePr>
+            <p:cNvPr id="15" name="对象 14"/>
+            <p:cNvGraphicFramePr>
+              <a:graphicFrameLocks noChangeAspect="1"/>
+            </p:cNvGraphicFramePr>
+            <p:nvPr>
+              <p:extLst>
+                <p:ext uri="{D42A27DB-BD31-4B8C-83A1-F6EECF244321}">
+                  <p14:modId xmlns:p14="http://schemas.microsoft.com/office/powerpoint/2010/main" val="836468119"/>
+                </p:ext>
+              </p:extLst>
+            </p:nvPr>
+          </p:nvGraphicFramePr>
+          <p:xfrm>
+            <a:off x="2813666" y="1538029"/>
+            <a:ext cx="1848358" cy="545858"/>
+          </p:xfrm>
+          <a:graphic>
+            <a:graphicData uri="http://schemas.openxmlformats.org/presentationml/2006/ole">
+              <mc:AlternateContent xmlns:mc="http://schemas.openxmlformats.org/markup-compatibility/2006">
+                <mc:Choice xmlns:v="urn:schemas-microsoft-com:vml" Requires="v">
+                  <p:oleObj spid="_x0000_s6169" name="Equation" r:id="rId12" imgW="1168400" imgH="393700" progId="Equation.DSMT4">
+                    <p:embed/>
+                  </p:oleObj>
+                </mc:Choice>
+                <mc:Fallback>
+                  <p:oleObj name="Equation" r:id="rId12" imgW="1168400" imgH="393700" progId="Equation.DSMT4">
+                    <p:embed/>
+                    <p:pic>
+                      <p:nvPicPr>
+                        <p:cNvPr id="0" name=""/>
+                        <p:cNvPicPr/>
+                        <p:nvPr/>
+                      </p:nvPicPr>
+                      <p:blipFill>
+                        <a:blip r:embed="rId13"/>
+                        <a:stretch>
+                          <a:fillRect/>
+                        </a:stretch>
+                      </p:blipFill>
+                      <p:spPr>
+                        <a:xfrm>
+                          <a:off x="2813666" y="1538029"/>
+                          <a:ext cx="1848358" cy="545858"/>
+                        </a:xfrm>
+                        <a:prstGeom prst="rect">
+                          <a:avLst/>
+                        </a:prstGeom>
+                      </p:spPr>
+                    </p:pic>
+                  </p:oleObj>
+                </mc:Fallback>
+              </mc:AlternateContent>
+            </a:graphicData>
+          </a:graphic>
+        </p:graphicFrame>
+        <p:sp>
+          <p:nvSpPr>
+            <p:cNvPr id="16" name="文本框 15"/>
+            <p:cNvSpPr txBox="1"/>
+            <p:nvPr/>
+          </p:nvSpPr>
+          <p:spPr>
+            <a:xfrm>
+              <a:off x="-3177806" y="-549250"/>
+              <a:ext cx="3110347" cy="461665"/>
+            </a:xfrm>
+            <a:prstGeom prst="rect">
+              <a:avLst/>
+            </a:prstGeom>
+            <a:noFill/>
+          </p:spPr>
+          <p:txBody>
+            <a:bodyPr wrap="none" rtlCol="0">
+              <a:spAutoFit/>
+            </a:bodyPr>
+            <a:lstStyle/>
+            <a:p>
+              <a:r>
+                <a:rPr kumimoji="1" lang="en-US" altLang="zh-CN" sz="2400" dirty="0" smtClean="0">
+                  <a:latin typeface="Helvetica"/>
+                  <a:cs typeface="Helvetica"/>
+                </a:rPr>
+                <a:t>Layout </a:t>
+              </a:r>
+              <a:r>
+                <a:rPr kumimoji="1" lang="en-US" altLang="zh-CN" sz="2400" dirty="0" smtClean="0">
+                  <a:latin typeface="Helvetica"/>
+                  <a:cs typeface="Helvetica"/>
+                </a:rPr>
+                <a:t>for </a:t>
+              </a:r>
+              <a:r>
+                <a:rPr kumimoji="1" lang="en-US" altLang="zh-CN" sz="2400" dirty="0" smtClean="0">
+                  <a:latin typeface="Helvetica"/>
+                  <a:cs typeface="Helvetica"/>
+                </a:rPr>
+                <a:t>each block</a:t>
+              </a:r>
+              <a:endParaRPr kumimoji="1" lang="zh-CN" altLang="en-US" sz="2400" dirty="0">
                 <a:latin typeface="Helvetica"/>
                 <a:cs typeface="Helvetica"/>
-              </a:rPr>
-              <a:t>Layout in each block</a:t>
-            </a:r>
-            <a:endParaRPr kumimoji="1" lang="zh-CN" altLang="en-US" sz="2400" dirty="0">
-              <a:latin typeface="Helvetica"/>
-              <a:cs typeface="Helvetica"/>
-            </a:endParaRPr>
-          </a:p>
-        </p:txBody>
-      </p:sp>
+              </a:endParaRPr>
+            </a:p>
+          </p:txBody>
+        </p:sp>
+      </p:grpSp>
     </p:spTree>
     <p:extLst>
       <p:ext uri="{BB962C8B-B14F-4D97-AF65-F5344CB8AC3E}">

</xml_diff>